<commit_message>
Final Final Presentation with all Slides
</commit_message>
<xml_diff>
--- a/Presentation.pptx
+++ b/Presentation.pptx
@@ -3437,7 +3437,7 @@
                 <a16:creationId xmlns:a16="http://schemas.microsoft.com/office/drawing/2014/main" id="{AB45A142-4255-493C-8284-5D566C121B10}"/>
               </a:ext>
               <a:ext uri="{C183D7F6-B498-43B3-948B-1728B52AA6E4}">
-                <adec:decorative xmlns:adec="http://schemas.microsoft.com/office/drawing/2017/decorative" xmlns="" val="1"/>
+                <adec:decorative xmlns="" xmlns:adec="http://schemas.microsoft.com/office/drawing/2017/decorative" val="1"/>
               </a:ext>
             </a:extLst>
           </p:cNvPr>
@@ -3549,7 +3549,7 @@
                 <a16:creationId xmlns:a16="http://schemas.microsoft.com/office/drawing/2014/main" id="{38FB9660-F42F-4313-BBC4-47C007FE484C}"/>
               </a:ext>
               <a:ext uri="{C183D7F6-B498-43B3-948B-1728B52AA6E4}">
-                <adec:decorative xmlns:adec="http://schemas.microsoft.com/office/drawing/2017/decorative" xmlns="" val="1"/>
+                <adec:decorative xmlns="" xmlns:adec="http://schemas.microsoft.com/office/drawing/2017/decorative" val="1"/>
               </a:ext>
             </a:extLst>
           </p:cNvPr>
@@ -3786,9 +3786,66 @@
               <a:t>GitHub: </a:t>
             </a:r>
             <a:r>
-              <a:rPr lang="en-US" dirty="0"/>
-              <a:t>https://github.com/TSLogan-UTM/PARTYapp</a:t>
-            </a:r>
+              <a:rPr lang="en-US" dirty="0">
+                <a:hlinkClick r:id="rId2"/>
+              </a:rPr>
+              <a:t>https://</a:t>
+            </a:r>
+            <a:r>
+              <a:rPr lang="en-US" dirty="0" smtClean="0">
+                <a:hlinkClick r:id="rId2"/>
+              </a:rPr>
+              <a:t>github.com/TSLogan-UTM/PARTYapp</a:t>
+            </a:r>
+            <a:endParaRPr lang="en-US" dirty="0" smtClean="0"/>
+          </a:p>
+          <a:p>
+            <a:endParaRPr lang="en-US" dirty="0"/>
+          </a:p>
+          <a:p>
+            <a:r>
+              <a:rPr lang="en-US" dirty="0" smtClean="0"/>
+              <a:t>Thomas: </a:t>
+            </a:r>
+            <a:r>
+              <a:rPr lang="en-US" dirty="0" smtClean="0">
+                <a:hlinkClick r:id="rId3"/>
+              </a:rPr>
+              <a:t>thosloga@ut.utm.edu</a:t>
+            </a:r>
+            <a:endParaRPr lang="en-US" dirty="0" smtClean="0"/>
+          </a:p>
+          <a:p>
+            <a:r>
+              <a:rPr lang="en-US" dirty="0" smtClean="0"/>
+              <a:t>Vincent: </a:t>
+            </a:r>
+            <a:r>
+              <a:rPr lang="en-US" dirty="0">
+                <a:hlinkClick r:id="rId4"/>
+              </a:rPr>
+              <a:t>vinomano@ut.utm.edu</a:t>
+            </a:r>
+            <a:endParaRPr lang="en-US" dirty="0" smtClean="0"/>
+          </a:p>
+          <a:p>
+            <a:r>
+              <a:rPr lang="en-US" dirty="0" smtClean="0"/>
+              <a:t>Brett: </a:t>
+            </a:r>
+            <a:r>
+              <a:rPr lang="en-US" dirty="0">
+                <a:hlinkClick r:id="rId5"/>
+              </a:rPr>
+              <a:t>jerbbive@ut.utm.edu</a:t>
+            </a:r>
+            <a:endParaRPr lang="en-US" dirty="0"/>
+          </a:p>
+          <a:p>
+            <a:pPr marL="0" indent="0">
+              <a:buNone/>
+            </a:pPr>
+            <a:endParaRPr lang="en-US" dirty="0"/>
           </a:p>
         </p:txBody>
       </p:sp>

</xml_diff>